<commit_message>
Replace typedef with using.
</commit_message>
<xml_diff>
--- a/教案/第00章 语言基础.pptx
+++ b/教案/第00章 语言基础.pptx
@@ -375,7 +375,7 @@
           <a:p>
             <a:fld id="{07D5EC8A-DED5-4534-8812-4BFE99EACB50}" type="datetimeFigureOut">
               <a:rPr lang="zh-CN" altLang="en-US" smtClean="0"/>
-              <a:t>2020-09-23</a:t>
+              <a:t>2022/9/8</a:t>
             </a:fld>
             <a:endParaRPr lang="zh-CN" altLang="en-US"/>
           </a:p>
@@ -18369,7 +18369,7 @@
                 <a:latin typeface="Courier New" panose="02070309020205020404" pitchFamily="49" charset="0"/>
                 <a:cs typeface="Courier New" panose="02070309020205020404" pitchFamily="49" charset="0"/>
               </a:rPr>
-              <a:t>// typedef int T[n];</a:t>
+              <a:t>// using T = int[n];</a:t>
             </a:r>
             <a:endParaRPr lang="zh-CN" altLang="en-US" sz="1400" b="1" dirty="0">
               <a:solidFill>

</xml_diff>